<commit_message>
PPT updated for table definition
</commit_message>
<xml_diff>
--- a/End-To-End Rapid API Development With DotNet Core .pptx
+++ b/End-To-End Rapid API Development With DotNet Core .pptx
@@ -6,7 +6,7 @@
     <p:sldMasterId id="2147483677" r:id="rId5"/>
   </p:sldMasterIdLst>
   <p:notesMasterIdLst>
-    <p:notesMasterId r:id="rId19"/>
+    <p:notesMasterId r:id="rId20"/>
   </p:notesMasterIdLst>
   <p:sldIdLst>
     <p:sldId id="307" r:id="rId6"/>
@@ -17,11 +17,12 @@
     <p:sldId id="298" r:id="rId11"/>
     <p:sldId id="306" r:id="rId12"/>
     <p:sldId id="301" r:id="rId13"/>
-    <p:sldId id="302" r:id="rId14"/>
-    <p:sldId id="303" r:id="rId15"/>
-    <p:sldId id="304" r:id="rId16"/>
-    <p:sldId id="305" r:id="rId17"/>
-    <p:sldId id="296" r:id="rId18"/>
+    <p:sldId id="308" r:id="rId14"/>
+    <p:sldId id="302" r:id="rId15"/>
+    <p:sldId id="303" r:id="rId16"/>
+    <p:sldId id="304" r:id="rId17"/>
+    <p:sldId id="305" r:id="rId18"/>
+    <p:sldId id="296" r:id="rId19"/>
   </p:sldIdLst>
   <p:sldSz cx="12192000" cy="6858000"/>
   <p:notesSz cx="6858000" cy="9144000"/>
@@ -655,7 +656,7 @@
     </p:spTree>
     <p:extLst>
       <p:ext uri="{BB962C8B-B14F-4D97-AF65-F5344CB8AC3E}">
-        <p14:creationId xmlns:p14="http://schemas.microsoft.com/office/powerpoint/2010/main" val="3707657129"/>
+        <p14:creationId xmlns:p14="http://schemas.microsoft.com/office/powerpoint/2010/main" val="1013198166"/>
       </p:ext>
     </p:extLst>
   </p:cSld>
@@ -747,7 +748,7 @@
     </p:spTree>
     <p:extLst>
       <p:ext uri="{BB962C8B-B14F-4D97-AF65-F5344CB8AC3E}">
-        <p14:creationId xmlns:p14="http://schemas.microsoft.com/office/powerpoint/2010/main" val="2307465240"/>
+        <p14:creationId xmlns:p14="http://schemas.microsoft.com/office/powerpoint/2010/main" val="3707657129"/>
       </p:ext>
     </p:extLst>
   </p:cSld>
@@ -831,6 +832,98 @@
               <a:rPr lang="en-US" smtClean="0"/>
               <a:pPr/>
               <a:t>13</a:t>
+            </a:fld>
+            <a:endParaRPr lang="en-US" dirty="0"/>
+          </a:p>
+        </p:txBody>
+      </p:sp>
+    </p:spTree>
+    <p:extLst>
+      <p:ext uri="{BB962C8B-B14F-4D97-AF65-F5344CB8AC3E}">
+        <p14:creationId xmlns:p14="http://schemas.microsoft.com/office/powerpoint/2010/main" val="2307465240"/>
+      </p:ext>
+    </p:extLst>
+  </p:cSld>
+  <p:clrMapOvr>
+    <a:masterClrMapping/>
+  </p:clrMapOvr>
+</p:notes>
+</file>
+
+<file path=ppt/notesSlides/notesSlide13.xml><?xml version="1.0" encoding="utf-8"?>
+<p:notes xmlns:a="http://schemas.openxmlformats.org/drawingml/2006/main" xmlns:r="http://schemas.openxmlformats.org/officeDocument/2006/relationships" xmlns:p="http://schemas.openxmlformats.org/presentationml/2006/main">
+  <p:cSld>
+    <p:spTree>
+      <p:nvGrpSpPr>
+        <p:cNvPr id="1" name=""/>
+        <p:cNvGrpSpPr/>
+        <p:nvPr/>
+      </p:nvGrpSpPr>
+      <p:grpSpPr>
+        <a:xfrm>
+          <a:off x="0" y="0"/>
+          <a:ext cx="0" cy="0"/>
+          <a:chOff x="0" y="0"/>
+          <a:chExt cx="0" cy="0"/>
+        </a:xfrm>
+      </p:grpSpPr>
+      <p:sp>
+        <p:nvSpPr>
+          <p:cNvPr id="2" name="Slide Image Placeholder 1"/>
+          <p:cNvSpPr>
+            <a:spLocks noGrp="1" noRot="1" noChangeAspect="1"/>
+          </p:cNvSpPr>
+          <p:nvPr>
+            <p:ph type="sldImg"/>
+          </p:nvPr>
+        </p:nvSpPr>
+        <p:spPr>
+          <a:xfrm>
+            <a:off x="381000" y="685800"/>
+            <a:ext cx="6096000" cy="3429000"/>
+          </a:xfrm>
+        </p:spPr>
+      </p:sp>
+      <p:sp>
+        <p:nvSpPr>
+          <p:cNvPr id="3" name="Notes Placeholder 2"/>
+          <p:cNvSpPr>
+            <a:spLocks noGrp="1"/>
+          </p:cNvSpPr>
+          <p:nvPr>
+            <p:ph type="body" idx="1"/>
+          </p:nvPr>
+        </p:nvSpPr>
+        <p:spPr/>
+        <p:txBody>
+          <a:bodyPr>
+            <a:normAutofit/>
+          </a:bodyPr>
+          <a:lstStyle/>
+          <a:p>
+            <a:endParaRPr lang="en-CA" b="0" dirty="0"/>
+          </a:p>
+        </p:txBody>
+      </p:sp>
+      <p:sp>
+        <p:nvSpPr>
+          <p:cNvPr id="4" name="Slide Number Placeholder 3"/>
+          <p:cNvSpPr>
+            <a:spLocks noGrp="1"/>
+          </p:cNvSpPr>
+          <p:nvPr>
+            <p:ph type="sldNum" sz="quarter" idx="10"/>
+          </p:nvPr>
+        </p:nvSpPr>
+        <p:spPr/>
+        <p:txBody>
+          <a:bodyPr/>
+          <a:lstStyle/>
+          <a:p>
+            <a:fld id="{13F0F35F-DD44-4607-AEC1-49D7A4BC4066}" type="slidenum">
+              <a:rPr lang="en-US" smtClean="0"/>
+              <a:pPr/>
+              <a:t>14</a:t>
             </a:fld>
             <a:endParaRPr lang="en-US" dirty="0"/>
           </a:p>
@@ -1476,7 +1569,7 @@
     </p:spTree>
     <p:extLst>
       <p:ext uri="{BB962C8B-B14F-4D97-AF65-F5344CB8AC3E}">
-        <p14:creationId xmlns:p14="http://schemas.microsoft.com/office/powerpoint/2010/main" val="3841073768"/>
+        <p14:creationId xmlns:p14="http://schemas.microsoft.com/office/powerpoint/2010/main" val="3211294657"/>
       </p:ext>
     </p:extLst>
   </p:cSld>
@@ -1568,7 +1661,7 @@
     </p:spTree>
     <p:extLst>
       <p:ext uri="{BB962C8B-B14F-4D97-AF65-F5344CB8AC3E}">
-        <p14:creationId xmlns:p14="http://schemas.microsoft.com/office/powerpoint/2010/main" val="1013198166"/>
+        <p14:creationId xmlns:p14="http://schemas.microsoft.com/office/powerpoint/2010/main" val="3841073768"/>
       </p:ext>
     </p:extLst>
   </p:cSld>
@@ -7820,10 +7913,287 @@
           </a:bodyPr>
           <a:lstStyle/>
           <a:p>
-            <a:pPr lvl="0"/>
             <a:r>
               <a:rPr lang="en-US" sz="3200" b="1" dirty="0"/>
               <a:t>03</a:t>
+            </a:r>
+            <a:r>
+              <a:rPr lang="en-US" sz="3200" b="1" dirty="0">
+                <a:solidFill>
+                  <a:srgbClr val="00B0F0"/>
+                </a:solidFill>
+              </a:rPr>
+              <a:t>|</a:t>
+            </a:r>
+            <a:r>
+              <a:rPr lang="en-US" sz="3200" b="1" dirty="0"/>
+              <a:t> API Creation</a:t>
+            </a:r>
+            <a:br>
+              <a:rPr lang="en-US" sz="3200" b="1" dirty="0"/>
+            </a:br>
+            <a:endParaRPr lang="en-US" sz="3200" b="1" dirty="0"/>
+          </a:p>
+        </p:txBody>
+      </p:sp>
+      <p:sp>
+        <p:nvSpPr>
+          <p:cNvPr id="3" name="Content Placeholder 2"/>
+          <p:cNvSpPr>
+            <a:spLocks noGrp="1"/>
+          </p:cNvSpPr>
+          <p:nvPr>
+            <p:ph sz="quarter" idx="10"/>
+          </p:nvPr>
+        </p:nvSpPr>
+        <p:spPr>
+          <a:xfrm>
+            <a:off x="379413" y="820396"/>
+            <a:ext cx="11525250" cy="5858218"/>
+          </a:xfrm>
+        </p:spPr>
+        <p:txBody>
+          <a:bodyPr/>
+          <a:lstStyle/>
+          <a:p>
+            <a:pPr marL="342783" lvl="1" indent="-342783">
+              <a:spcBef>
+                <a:spcPts val="1400"/>
+              </a:spcBef>
+              <a:buFont typeface="Arial" pitchFamily="34" charset="0"/>
+              <a:buChar char="•"/>
+            </a:pPr>
+            <a:r>
+              <a:rPr lang="en-US" sz="2400" b="1" dirty="0" err="1"/>
+              <a:t>Meetup.Api</a:t>
+            </a:r>
+            <a:endParaRPr lang="en-US" sz="1800" b="1" dirty="0">
+              <a:solidFill>
+                <a:schemeClr val="tx1"/>
+              </a:solidFill>
+            </a:endParaRPr>
+          </a:p>
+          <a:p>
+            <a:pPr lvl="1"/>
+            <a:endParaRPr lang="en-US" sz="1800" b="1" dirty="0"/>
+          </a:p>
+          <a:p>
+            <a:pPr lvl="1"/>
+            <a:r>
+              <a:rPr lang="en-US" sz="1800" b="1" dirty="0"/>
+              <a:t>Create </a:t>
+            </a:r>
+            <a:r>
+              <a:rPr lang="en-US" sz="1800" b="1" dirty="0" err="1"/>
+              <a:t>.Net</a:t>
+            </a:r>
+            <a:r>
+              <a:rPr lang="en-US" sz="1800" b="1" dirty="0"/>
+              <a:t> Core Web API project</a:t>
+            </a:r>
+          </a:p>
+          <a:p>
+            <a:pPr lvl="1"/>
+            <a:r>
+              <a:rPr lang="en-US" sz="1800" b="1" dirty="0"/>
+              <a:t>Add </a:t>
+            </a:r>
+            <a:r>
+              <a:rPr lang="en-US" sz="1800" b="1" dirty="0" err="1"/>
+              <a:t>meetup</a:t>
+            </a:r>
+            <a:r>
+              <a:rPr lang="en-US" sz="1800" b="1" dirty="0"/>
+              <a:t> controller using Entity Framework</a:t>
+            </a:r>
+          </a:p>
+          <a:p>
+            <a:pPr lvl="1"/>
+            <a:r>
+              <a:rPr lang="en-US" sz="1800" b="1" dirty="0"/>
+              <a:t>Run and invoke value controller to verify the initial structure</a:t>
+            </a:r>
+          </a:p>
+          <a:p>
+            <a:pPr lvl="1"/>
+            <a:r>
+              <a:rPr lang="en-US" sz="1800" b="1" dirty="0"/>
+              <a:t>Add Swagger</a:t>
+            </a:r>
+          </a:p>
+          <a:p>
+            <a:pPr lvl="2"/>
+            <a:endParaRPr lang="en-US" sz="1050" b="1" dirty="0"/>
+          </a:p>
+          <a:p>
+            <a:pPr lvl="2"/>
+            <a:r>
+              <a:rPr lang="en-US" sz="1600" b="1" dirty="0" err="1"/>
+              <a:t>Nuget</a:t>
+            </a:r>
+            <a:r>
+              <a:rPr lang="en-US" sz="1600" b="1" dirty="0"/>
+              <a:t> package: </a:t>
+            </a:r>
+            <a:r>
+              <a:rPr lang="en-US" sz="1600" b="1" dirty="0" err="1"/>
+              <a:t>Swashbuckle.AspNetCore</a:t>
+            </a:r>
+            <a:endParaRPr lang="en-US" sz="1600" b="1" dirty="0"/>
+          </a:p>
+          <a:p>
+            <a:pPr lvl="2"/>
+            <a:r>
+              <a:rPr lang="en-US" sz="1600" b="1" dirty="0"/>
+              <a:t>Usage: </a:t>
+            </a:r>
+            <a:r>
+              <a:rPr lang="en-US" sz="1600" b="1" dirty="0">
+                <a:hlinkClick r:id="rId3"/>
+              </a:rPr>
+              <a:t>https://github.com/domaindrivendev/Swashbuckle.AspNetCore</a:t>
+            </a:r>
+            <a:endParaRPr lang="en-US" sz="1600" b="1" dirty="0"/>
+          </a:p>
+          <a:p>
+            <a:pPr lvl="1"/>
+            <a:endParaRPr lang="en-US" sz="1800" b="1" dirty="0"/>
+          </a:p>
+          <a:p>
+            <a:pPr lvl="1"/>
+            <a:r>
+              <a:rPr lang="en-US" sz="1800" b="1" dirty="0"/>
+              <a:t>Test Get/Post with Swagger</a:t>
+            </a:r>
+          </a:p>
+          <a:p>
+            <a:pPr lvl="1"/>
+            <a:endParaRPr lang="en-US" sz="1800" b="1" dirty="0"/>
+          </a:p>
+          <a:p>
+            <a:pPr lvl="1"/>
+            <a:r>
+              <a:rPr lang="en-US" sz="1800" b="1" dirty="0"/>
+              <a:t>Add Analyzer</a:t>
+            </a:r>
+          </a:p>
+          <a:p>
+            <a:pPr lvl="2"/>
+            <a:r>
+              <a:rPr lang="en-US" sz="1400" b="1" dirty="0" err="1"/>
+              <a:t>Nuget</a:t>
+            </a:r>
+            <a:r>
+              <a:rPr lang="en-US" sz="1400" b="1" dirty="0"/>
+              <a:t> Package: </a:t>
+            </a:r>
+            <a:r>
+              <a:rPr lang="en-US" sz="1400" b="1" dirty="0" err="1"/>
+              <a:t>Microsoft.AspNetCore.Mvc.Api.Analyzers</a:t>
+            </a:r>
+            <a:endParaRPr lang="en-US" sz="1400" b="1" dirty="0"/>
+          </a:p>
+          <a:p>
+            <a:pPr lvl="1"/>
+            <a:endParaRPr lang="en-US" sz="1800" b="1" dirty="0"/>
+          </a:p>
+          <a:p>
+            <a:pPr lvl="1"/>
+            <a:r>
+              <a:rPr lang="en-US" sz="1800" b="1" dirty="0"/>
+              <a:t>Verify Analyzer effects</a:t>
+            </a:r>
+          </a:p>
+        </p:txBody>
+      </p:sp>
+      <p:cxnSp>
+        <p:nvCxnSpPr>
+          <p:cNvPr id="4" name="Straight Connector 3"/>
+          <p:cNvCxnSpPr/>
+          <p:nvPr/>
+        </p:nvCxnSpPr>
+        <p:spPr>
+          <a:xfrm>
+            <a:off x="379413" y="717261"/>
+            <a:ext cx="11235847" cy="0"/>
+          </a:xfrm>
+          <a:prstGeom prst="line">
+            <a:avLst/>
+          </a:prstGeom>
+          <a:ln w="82550" cmpd="sng">
+            <a:solidFill>
+              <a:schemeClr val="accent5">
+                <a:lumMod val="75000"/>
+              </a:schemeClr>
+            </a:solidFill>
+          </a:ln>
+        </p:spPr>
+        <p:style>
+          <a:lnRef idx="1">
+            <a:schemeClr val="accent1"/>
+          </a:lnRef>
+          <a:fillRef idx="0">
+            <a:schemeClr val="accent1"/>
+          </a:fillRef>
+          <a:effectRef idx="0">
+            <a:schemeClr val="accent1"/>
+          </a:effectRef>
+          <a:fontRef idx="minor">
+            <a:schemeClr val="tx1"/>
+          </a:fontRef>
+        </p:style>
+      </p:cxnSp>
+    </p:spTree>
+    <p:extLst>
+      <p:ext uri="{BB962C8B-B14F-4D97-AF65-F5344CB8AC3E}">
+        <p14:creationId xmlns:p14="http://schemas.microsoft.com/office/powerpoint/2010/main" val="3890724848"/>
+      </p:ext>
+    </p:extLst>
+  </p:cSld>
+  <p:clrMapOvr>
+    <a:masterClrMapping/>
+  </p:clrMapOvr>
+</p:sld>
+</file>
+
+<file path=ppt/slides/slide11.xml><?xml version="1.0" encoding="utf-8"?>
+<p:sld xmlns:a="http://schemas.openxmlformats.org/drawingml/2006/main" xmlns:r="http://schemas.openxmlformats.org/officeDocument/2006/relationships" xmlns:p="http://schemas.openxmlformats.org/presentationml/2006/main">
+  <p:cSld>
+    <p:spTree>
+      <p:nvGrpSpPr>
+        <p:cNvPr id="1" name=""/>
+        <p:cNvGrpSpPr/>
+        <p:nvPr/>
+      </p:nvGrpSpPr>
+      <p:grpSpPr>
+        <a:xfrm>
+          <a:off x="0" y="0"/>
+          <a:ext cx="0" cy="0"/>
+          <a:chOff x="0" y="0"/>
+          <a:chExt cx="0" cy="0"/>
+        </a:xfrm>
+      </p:grpSpPr>
+      <p:sp>
+        <p:nvSpPr>
+          <p:cNvPr id="2" name="Title 1"/>
+          <p:cNvSpPr>
+            <a:spLocks noGrp="1"/>
+          </p:cNvSpPr>
+          <p:nvPr>
+            <p:ph type="title"/>
+          </p:nvPr>
+        </p:nvSpPr>
+        <p:spPr/>
+        <p:txBody>
+          <a:bodyPr>
+            <a:normAutofit/>
+          </a:bodyPr>
+          <a:lstStyle/>
+          <a:p>
+            <a:pPr lvl="0"/>
+            <a:r>
+              <a:rPr lang="en-US" sz="3200" b="1" dirty="0"/>
+              <a:t>04</a:t>
             </a:r>
             <a:r>
               <a:rPr lang="en-US" sz="3200" b="1" dirty="0">
@@ -7978,7 +8348,7 @@
 </p:sld>
 </file>
 
-<file path=ppt/slides/slide11.xml><?xml version="1.0" encoding="utf-8"?>
+<file path=ppt/slides/slide12.xml><?xml version="1.0" encoding="utf-8"?>
 <p:sld xmlns:a="http://schemas.openxmlformats.org/drawingml/2006/main" xmlns:r="http://schemas.openxmlformats.org/officeDocument/2006/relationships" xmlns:p="http://schemas.openxmlformats.org/presentationml/2006/main">
   <p:cSld>
     <p:spTree>
@@ -8015,7 +8385,7 @@
             <a:pPr lvl="0"/>
             <a:r>
               <a:rPr lang="en-US" sz="3200" b="1" dirty="0"/>
-              <a:t>04</a:t>
+              <a:t>05</a:t>
             </a:r>
             <a:r>
               <a:rPr lang="en-US" sz="3200" b="1" dirty="0">
@@ -8172,7 +8542,7 @@
 </p:sld>
 </file>
 
-<file path=ppt/slides/slide12.xml><?xml version="1.0" encoding="utf-8"?>
+<file path=ppt/slides/slide13.xml><?xml version="1.0" encoding="utf-8"?>
 <p:sld xmlns:a="http://schemas.openxmlformats.org/drawingml/2006/main" xmlns:r="http://schemas.openxmlformats.org/officeDocument/2006/relationships" xmlns:p="http://schemas.openxmlformats.org/presentationml/2006/main">
   <p:cSld>
     <p:spTree>
@@ -8208,7 +8578,7 @@
           <a:p>
             <a:r>
               <a:rPr lang="en-US" sz="3200" b="1" dirty="0"/>
-              <a:t>05</a:t>
+              <a:t>06</a:t>
             </a:r>
             <a:r>
               <a:rPr lang="en-US" sz="3200" b="1" dirty="0">
@@ -8522,7 +8892,7 @@
 </p:sld>
 </file>
 
-<file path=ppt/slides/slide13.xml><?xml version="1.0" encoding="utf-8"?>
+<file path=ppt/slides/slide14.xml><?xml version="1.0" encoding="utf-8"?>
 <p:sld xmlns:a="http://schemas.openxmlformats.org/drawingml/2006/main" xmlns:r="http://schemas.openxmlformats.org/officeDocument/2006/relationships" xmlns:p="http://schemas.openxmlformats.org/presentationml/2006/main">
   <p:cSld>
     <p:spTree>
@@ -10507,7 +10877,7 @@
             </a:r>
             <a:r>
               <a:rPr lang="en-US" sz="3200" b="1" dirty="0"/>
-              <a:t> Model Creation</a:t>
+              <a:t> Database Creation</a:t>
             </a:r>
           </a:p>
         </p:txBody>
@@ -10535,7 +10905,7 @@
             <a:pPr marL="400031" indent="-342900"/>
             <a:r>
               <a:rPr lang="en-US" sz="2400" b="1" dirty="0" err="1"/>
-              <a:t>Meetup.Entities</a:t>
+              <a:t>Meetup.Db</a:t>
             </a:r>
             <a:br>
               <a:rPr lang="en-US" sz="2000" b="1" dirty="0"/>
@@ -10558,7 +10928,7 @@
             </a:r>
             <a:r>
               <a:rPr lang="en-US" sz="1600" b="1" dirty="0"/>
-              <a:t> Standard Library project</a:t>
+              <a:t> Framework database type project</a:t>
             </a:r>
           </a:p>
           <a:p>
@@ -10569,99 +10939,110 @@
             <a:pPr lvl="1"/>
             <a:r>
               <a:rPr lang="en-US" sz="1600" b="1" dirty="0"/>
-              <a:t>Add nugget packages</a:t>
-            </a:r>
-          </a:p>
-          <a:p>
-            <a:pPr lvl="2"/>
-            <a:endParaRPr lang="en-US" sz="1000" b="1" dirty="0"/>
-          </a:p>
-          <a:p>
-            <a:pPr lvl="2"/>
-            <a:r>
-              <a:rPr lang="en-US" sz="1400" b="1" dirty="0" err="1"/>
-              <a:t>Microsoft.EntityFrameworkCore</a:t>
-            </a:r>
-            <a:endParaRPr lang="en-US" sz="1400" b="1" dirty="0"/>
-          </a:p>
-          <a:p>
-            <a:pPr lvl="2"/>
-            <a:r>
-              <a:rPr lang="en-US" sz="1400" b="1" dirty="0" err="1"/>
-              <a:t>Microsoft.EntityFrameworkCore.SqlServer</a:t>
-            </a:r>
-            <a:endParaRPr lang="en-US" sz="1400" b="1" dirty="0"/>
+              <a:t>Add </a:t>
+            </a:r>
+            <a:r>
+              <a:rPr lang="en-US" sz="1600" b="1" dirty="0" err="1"/>
+              <a:t>MeetupDetail</a:t>
+            </a:r>
+            <a:r>
+              <a:rPr lang="en-US" sz="1600" b="1" dirty="0"/>
+              <a:t> table</a:t>
+            </a:r>
           </a:p>
           <a:p>
             <a:pPr lvl="1"/>
             <a:endParaRPr lang="en-US" sz="1600" b="1" dirty="0"/>
           </a:p>
           <a:p>
+            <a:pPr marL="856960" lvl="2" indent="0">
+              <a:buNone/>
+            </a:pPr>
+            <a:r>
+              <a:rPr lang="en-HK" sz="1200" b="1" dirty="0"/>
+              <a:t>CREATE TABLE [</a:t>
+            </a:r>
+            <a:r>
+              <a:rPr lang="en-HK" sz="1200" b="1" dirty="0" err="1"/>
+              <a:t>dbo</a:t>
+            </a:r>
+            <a:r>
+              <a:rPr lang="en-HK" sz="1200" b="1" dirty="0"/>
+              <a:t>].[</a:t>
+            </a:r>
+            <a:r>
+              <a:rPr lang="en-HK" sz="1200" b="1" dirty="0" err="1"/>
+              <a:t>MeetupDetail</a:t>
+            </a:r>
+            <a:r>
+              <a:rPr lang="en-HK" sz="1200" b="1" dirty="0"/>
+              <a:t>]</a:t>
+            </a:r>
+          </a:p>
+          <a:p>
+            <a:pPr marL="856960" lvl="2" indent="0">
+              <a:buNone/>
+            </a:pPr>
+            <a:r>
+              <a:rPr lang="en-HK" sz="1200" b="1" dirty="0"/>
+              <a:t>(</a:t>
+            </a:r>
+          </a:p>
+          <a:p>
+            <a:pPr marL="856960" lvl="2" indent="0">
+              <a:buNone/>
+            </a:pPr>
+            <a:r>
+              <a:rPr lang="en-HK" sz="1200" b="1" dirty="0"/>
+              <a:t>	[Id] INT NOT NULL PRIMARY KEY,</a:t>
+            </a:r>
+          </a:p>
+          <a:p>
+            <a:pPr marL="856960" lvl="2" indent="0">
+              <a:buNone/>
+            </a:pPr>
+            <a:r>
+              <a:rPr lang="en-HK" sz="1200" b="1" dirty="0"/>
+              <a:t>	[Date] DATETIME2,</a:t>
+            </a:r>
+          </a:p>
+          <a:p>
+            <a:pPr marL="856960" lvl="2" indent="0">
+              <a:buNone/>
+            </a:pPr>
+            <a:r>
+              <a:rPr lang="en-HK" sz="1200" b="1" dirty="0"/>
+              <a:t>	[Topic] VARCHAR(500),</a:t>
+            </a:r>
+          </a:p>
+          <a:p>
+            <a:pPr marL="856960" lvl="2" indent="0">
+              <a:buNone/>
+            </a:pPr>
+            <a:r>
+              <a:rPr lang="en-HK" sz="1200" b="1" dirty="0"/>
+              <a:t>	[</a:t>
+            </a:r>
+            <a:r>
+              <a:rPr lang="en-HK" sz="1200" b="1" dirty="0" err="1"/>
+              <a:t>ParticipantsCount</a:t>
+            </a:r>
+            <a:r>
+              <a:rPr lang="en-HK" sz="1200" b="1" dirty="0"/>
+              <a:t>] INT</a:t>
+            </a:r>
+          </a:p>
+          <a:p>
+            <a:pPr marL="856960" lvl="2" indent="0">
+              <a:buNone/>
+            </a:pPr>
+            <a:r>
+              <a:rPr lang="en-HK" sz="1200" b="1" dirty="0"/>
+              <a:t>)</a:t>
+            </a:r>
+          </a:p>
+          <a:p>
             <a:pPr lvl="1"/>
-            <a:endParaRPr lang="en-US" sz="1600" b="1" dirty="0"/>
-          </a:p>
-          <a:p>
-            <a:pPr lvl="1"/>
-            <a:r>
-              <a:rPr lang="en-US" sz="1600" b="1" dirty="0"/>
-              <a:t>Generate model using scaffolding service</a:t>
-            </a:r>
-          </a:p>
-          <a:p>
-            <a:pPr lvl="1"/>
-            <a:endParaRPr lang="en-US" sz="1600" b="1" dirty="0"/>
-          </a:p>
-          <a:p>
-            <a:pPr lvl="2"/>
-            <a:r>
-              <a:rPr lang="en-US" sz="1100" b="1" dirty="0"/>
-              <a:t>Scaffold-</a:t>
-            </a:r>
-            <a:r>
-              <a:rPr lang="en-US" sz="1100" b="1" dirty="0" err="1"/>
-              <a:t>DbContext</a:t>
-            </a:r>
-            <a:r>
-              <a:rPr lang="en-US" sz="1100" b="1" dirty="0"/>
-              <a:t> "Data Source=.\</a:t>
-            </a:r>
-            <a:r>
-              <a:rPr lang="en-US" sz="1100" b="1" dirty="0" err="1"/>
-              <a:t>SQLEXPRESS;Initial</a:t>
-            </a:r>
-            <a:r>
-              <a:rPr lang="en-US" sz="1100" b="1" dirty="0"/>
-              <a:t> Catalog=</a:t>
-            </a:r>
-            <a:r>
-              <a:rPr lang="en-US" sz="1100" b="1" dirty="0" err="1"/>
-              <a:t>MeetupDb;Integrated</a:t>
-            </a:r>
-            <a:r>
-              <a:rPr lang="en-US" sz="1100" b="1" dirty="0"/>
-              <a:t> Security=SSPI;" </a:t>
-            </a:r>
-            <a:r>
-              <a:rPr lang="en-US" sz="1100" b="1" dirty="0" err="1"/>
-              <a:t>Microsoft.EntityFrameworkCore.SqlServer</a:t>
-            </a:r>
-            <a:r>
-              <a:rPr lang="en-US" sz="1100" b="1" dirty="0"/>
-              <a:t> -</a:t>
-            </a:r>
-            <a:r>
-              <a:rPr lang="en-US" sz="1100" b="1" dirty="0" err="1"/>
-              <a:t>OutputDir</a:t>
-            </a:r>
-            <a:r>
-              <a:rPr lang="en-US" sz="1100" b="1" dirty="0"/>
-              <a:t> Models –f</a:t>
-            </a:r>
-          </a:p>
-          <a:p>
-            <a:pPr marL="457046" lvl="1" indent="0">
-              <a:buNone/>
-            </a:pPr>
             <a:endParaRPr lang="en-US" sz="1600" b="1" dirty="0"/>
           </a:p>
         </p:txBody>
@@ -10764,12 +11145,8 @@
             </a:r>
             <a:r>
               <a:rPr lang="en-US" sz="3200" b="1" dirty="0"/>
-              <a:t> API Creation</a:t>
-            </a:r>
-            <a:br>
-              <a:rPr lang="en-US" sz="3200" b="1" dirty="0"/>
-            </a:br>
-            <a:endParaRPr lang="en-US" sz="3200" b="1" dirty="0"/>
+              <a:t> Model Creation</a:t>
+            </a:r>
           </a:p>
         </p:txBody>
       </p:sp>
@@ -10793,153 +11170,137 @@
           <a:bodyPr/>
           <a:lstStyle/>
           <a:p>
-            <a:pPr marL="342783" lvl="1" indent="-342783">
-              <a:spcBef>
-                <a:spcPts val="1400"/>
-              </a:spcBef>
-              <a:buFont typeface="Arial" pitchFamily="34" charset="0"/>
-              <a:buChar char="•"/>
+            <a:pPr marL="400031" indent="-342900"/>
+            <a:r>
+              <a:rPr lang="en-US" sz="2400" b="1" dirty="0" err="1"/>
+              <a:t>Meetup.Entities</a:t>
+            </a:r>
+            <a:br>
+              <a:rPr lang="en-US" sz="2000" b="1" dirty="0"/>
+            </a:br>
+            <a:endParaRPr lang="en-US" sz="2000" b="1" dirty="0"/>
+          </a:p>
+          <a:p>
+            <a:pPr lvl="1"/>
+            <a:endParaRPr lang="en-US" sz="1600" b="1" dirty="0"/>
+          </a:p>
+          <a:p>
+            <a:pPr lvl="1"/>
+            <a:r>
+              <a:rPr lang="en-US" sz="1600" b="1" dirty="0"/>
+              <a:t>Create </a:t>
+            </a:r>
+            <a:r>
+              <a:rPr lang="en-US" sz="1600" b="1" dirty="0" err="1"/>
+              <a:t>.Net</a:t>
+            </a:r>
+            <a:r>
+              <a:rPr lang="en-US" sz="1600" b="1" dirty="0"/>
+              <a:t> Standard Library project</a:t>
+            </a:r>
+          </a:p>
+          <a:p>
+            <a:pPr lvl="1"/>
+            <a:endParaRPr lang="en-US" sz="1600" b="1" dirty="0"/>
+          </a:p>
+          <a:p>
+            <a:pPr lvl="1"/>
+            <a:r>
+              <a:rPr lang="en-US" sz="1600" b="1" dirty="0"/>
+              <a:t>Add nugget packages</a:t>
+            </a:r>
+          </a:p>
+          <a:p>
+            <a:pPr lvl="2"/>
+            <a:endParaRPr lang="en-US" sz="1000" b="1" dirty="0"/>
+          </a:p>
+          <a:p>
+            <a:pPr lvl="2"/>
+            <a:r>
+              <a:rPr lang="en-US" sz="1400" b="1" dirty="0" err="1"/>
+              <a:t>Microsoft.EntityFrameworkCore</a:t>
+            </a:r>
+            <a:endParaRPr lang="en-US" sz="1400" b="1" dirty="0"/>
+          </a:p>
+          <a:p>
+            <a:pPr lvl="2"/>
+            <a:r>
+              <a:rPr lang="en-US" sz="1400" b="1" dirty="0" err="1"/>
+              <a:t>Microsoft.EntityFrameworkCore.SqlServer</a:t>
+            </a:r>
+            <a:endParaRPr lang="en-US" sz="1400" b="1" dirty="0"/>
+          </a:p>
+          <a:p>
+            <a:pPr lvl="1"/>
+            <a:endParaRPr lang="en-US" sz="1600" b="1" dirty="0"/>
+          </a:p>
+          <a:p>
+            <a:pPr lvl="1"/>
+            <a:endParaRPr lang="en-US" sz="1600" b="1" dirty="0"/>
+          </a:p>
+          <a:p>
+            <a:pPr lvl="1"/>
+            <a:r>
+              <a:rPr lang="en-US" sz="1600" b="1" dirty="0"/>
+              <a:t>Generate model using scaffolding service</a:t>
+            </a:r>
+          </a:p>
+          <a:p>
+            <a:pPr lvl="1"/>
+            <a:endParaRPr lang="en-US" sz="1600" b="1" dirty="0"/>
+          </a:p>
+          <a:p>
+            <a:pPr lvl="2"/>
+            <a:r>
+              <a:rPr lang="en-US" sz="1100" b="1" dirty="0"/>
+              <a:t>Scaffold-</a:t>
+            </a:r>
+            <a:r>
+              <a:rPr lang="en-US" sz="1100" b="1" dirty="0" err="1"/>
+              <a:t>DbContext</a:t>
+            </a:r>
+            <a:r>
+              <a:rPr lang="en-US" sz="1100" b="1" dirty="0"/>
+              <a:t> "Data Source=.\</a:t>
+            </a:r>
+            <a:r>
+              <a:rPr lang="en-US" sz="1100" b="1" dirty="0" err="1"/>
+              <a:t>SQLEXPRESS;Initial</a:t>
+            </a:r>
+            <a:r>
+              <a:rPr lang="en-US" sz="1100" b="1" dirty="0"/>
+              <a:t> Catalog=</a:t>
+            </a:r>
+            <a:r>
+              <a:rPr lang="en-US" sz="1100" b="1" dirty="0" err="1"/>
+              <a:t>MeetupDb;Integrated</a:t>
+            </a:r>
+            <a:r>
+              <a:rPr lang="en-US" sz="1100" b="1" dirty="0"/>
+              <a:t> Security=SSPI;" </a:t>
+            </a:r>
+            <a:r>
+              <a:rPr lang="en-US" sz="1100" b="1" dirty="0" err="1"/>
+              <a:t>Microsoft.EntityFrameworkCore.SqlServer</a:t>
+            </a:r>
+            <a:r>
+              <a:rPr lang="en-US" sz="1100" b="1" dirty="0"/>
+              <a:t> -</a:t>
+            </a:r>
+            <a:r>
+              <a:rPr lang="en-US" sz="1100" b="1" dirty="0" err="1"/>
+              <a:t>OutputDir</a:t>
+            </a:r>
+            <a:r>
+              <a:rPr lang="en-US" sz="1100" b="1" dirty="0"/>
+              <a:t> Models –f</a:t>
+            </a:r>
+          </a:p>
+          <a:p>
+            <a:pPr marL="457046" lvl="1" indent="0">
+              <a:buNone/>
             </a:pPr>
-            <a:r>
-              <a:rPr lang="en-US" sz="2400" b="1" dirty="0" err="1"/>
-              <a:t>Meetup.Api</a:t>
-            </a:r>
-            <a:endParaRPr lang="en-US" sz="1800" b="1" dirty="0">
-              <a:solidFill>
-                <a:schemeClr val="tx1"/>
-              </a:solidFill>
-            </a:endParaRPr>
-          </a:p>
-          <a:p>
-            <a:pPr lvl="1"/>
-            <a:endParaRPr lang="en-US" sz="1800" b="1" dirty="0"/>
-          </a:p>
-          <a:p>
-            <a:pPr lvl="1"/>
-            <a:r>
-              <a:rPr lang="en-US" sz="1800" b="1" dirty="0"/>
-              <a:t>Create </a:t>
-            </a:r>
-            <a:r>
-              <a:rPr lang="en-US" sz="1800" b="1" dirty="0" err="1"/>
-              <a:t>.Net</a:t>
-            </a:r>
-            <a:r>
-              <a:rPr lang="en-US" sz="1800" b="1" dirty="0"/>
-              <a:t> Core Web API project</a:t>
-            </a:r>
-          </a:p>
-          <a:p>
-            <a:pPr lvl="1"/>
-            <a:r>
-              <a:rPr lang="en-US" sz="1800" b="1" dirty="0"/>
-              <a:t>Add </a:t>
-            </a:r>
-            <a:r>
-              <a:rPr lang="en-US" sz="1800" b="1" dirty="0" err="1"/>
-              <a:t>meetup</a:t>
-            </a:r>
-            <a:r>
-              <a:rPr lang="en-US" sz="1800" b="1" dirty="0"/>
-              <a:t> controller using Entity Framework</a:t>
-            </a:r>
-          </a:p>
-          <a:p>
-            <a:pPr lvl="1"/>
-            <a:r>
-              <a:rPr lang="en-US" sz="1800" b="1" dirty="0"/>
-              <a:t>Run and invoke value controller to verify the initial structure</a:t>
-            </a:r>
-          </a:p>
-          <a:p>
-            <a:pPr lvl="1"/>
-            <a:r>
-              <a:rPr lang="en-US" sz="1800" b="1" dirty="0"/>
-              <a:t>Add Swagger</a:t>
-            </a:r>
-          </a:p>
-          <a:p>
-            <a:pPr lvl="2"/>
-            <a:endParaRPr lang="en-US" sz="1050" b="1" dirty="0"/>
-          </a:p>
-          <a:p>
-            <a:pPr lvl="2"/>
-            <a:r>
-              <a:rPr lang="en-US" sz="1600" b="1" dirty="0" err="1"/>
-              <a:t>Nuget</a:t>
-            </a:r>
-            <a:r>
-              <a:rPr lang="en-US" sz="1600" b="1" dirty="0"/>
-              <a:t> package: </a:t>
-            </a:r>
-            <a:r>
-              <a:rPr lang="en-US" sz="1600" b="1" dirty="0" err="1"/>
-              <a:t>Swashbuckle.AspNetCore</a:t>
-            </a:r>
             <a:endParaRPr lang="en-US" sz="1600" b="1" dirty="0"/>
-          </a:p>
-          <a:p>
-            <a:pPr lvl="2"/>
-            <a:r>
-              <a:rPr lang="en-US" sz="1600" b="1" dirty="0"/>
-              <a:t>Usage: </a:t>
-            </a:r>
-            <a:r>
-              <a:rPr lang="en-US" sz="1600" b="1" dirty="0">
-                <a:hlinkClick r:id="rId3"/>
-              </a:rPr>
-              <a:t>https://github.com/domaindrivendev/Swashbuckle.AspNetCore</a:t>
-            </a:r>
-            <a:endParaRPr lang="en-US" sz="1600" b="1" dirty="0"/>
-          </a:p>
-          <a:p>
-            <a:pPr lvl="1"/>
-            <a:endParaRPr lang="en-US" sz="1800" b="1" dirty="0"/>
-          </a:p>
-          <a:p>
-            <a:pPr lvl="1"/>
-            <a:r>
-              <a:rPr lang="en-US" sz="1800" b="1" dirty="0"/>
-              <a:t>Test Get/Post with Swagger</a:t>
-            </a:r>
-          </a:p>
-          <a:p>
-            <a:pPr lvl="1"/>
-            <a:endParaRPr lang="en-US" sz="1800" b="1" dirty="0"/>
-          </a:p>
-          <a:p>
-            <a:pPr lvl="1"/>
-            <a:r>
-              <a:rPr lang="en-US" sz="1800" b="1" dirty="0"/>
-              <a:t>Add Analyzer</a:t>
-            </a:r>
-          </a:p>
-          <a:p>
-            <a:pPr lvl="2"/>
-            <a:r>
-              <a:rPr lang="en-US" sz="1400" b="1" dirty="0" err="1"/>
-              <a:t>Nuget</a:t>
-            </a:r>
-            <a:r>
-              <a:rPr lang="en-US" sz="1400" b="1" dirty="0"/>
-              <a:t> Package: </a:t>
-            </a:r>
-            <a:r>
-              <a:rPr lang="en-US" sz="1400" b="1" dirty="0" err="1"/>
-              <a:t>Microsoft.AspNetCore.Mvc.Api.Analyzers</a:t>
-            </a:r>
-            <a:endParaRPr lang="en-US" sz="1400" b="1" dirty="0"/>
-          </a:p>
-          <a:p>
-            <a:pPr lvl="1"/>
-            <a:endParaRPr lang="en-US" sz="1800" b="1" dirty="0"/>
-          </a:p>
-          <a:p>
-            <a:pPr lvl="1"/>
-            <a:r>
-              <a:rPr lang="en-US" sz="1800" b="1" dirty="0"/>
-              <a:t>Verify Analyzer effects</a:t>
-            </a:r>
           </a:p>
         </p:txBody>
       </p:sp>
@@ -10983,7 +11344,7 @@
     </p:spTree>
     <p:extLst>
       <p:ext uri="{BB962C8B-B14F-4D97-AF65-F5344CB8AC3E}">
-        <p14:creationId xmlns:p14="http://schemas.microsoft.com/office/powerpoint/2010/main" val="3890724848"/>
+        <p14:creationId xmlns:p14="http://schemas.microsoft.com/office/powerpoint/2010/main" val="3504727087"/>
       </p:ext>
     </p:extLst>
   </p:cSld>
@@ -11845,6 +12206,15 @@
 </file>
 
 <file path=customXml/item2.xml><?xml version="1.0" encoding="utf-8"?>
+<?mso-contentType ?>
+<FormTemplates xmlns="http://schemas.microsoft.com/sharepoint/v3/contenttype/forms">
+  <Display>DocumentLibraryForm</Display>
+  <Edit>DocumentLibraryForm</Edit>
+  <New>DocumentLibraryForm</New>
+</FormTemplates>
+</file>
+
+<file path=customXml/item3.xml><?xml version="1.0" encoding="utf-8"?>
 <ct:contentTypeSchema xmlns:ct="http://schemas.microsoft.com/office/2006/metadata/contentType" xmlns:ma="http://schemas.microsoft.com/office/2006/metadata/properties/metaAttributes" ct:_="" ma:_="" ma:contentTypeName="Document" ma:contentTypeID="0x0101007946DDFB0B36E2409D611D00FC3D4DB4" ma:contentTypeVersion="" ma:contentTypeDescription="Create a new document." ma:contentTypeScope="" ma:versionID="9168b737cc82d0d0c917f967c1a24543">
   <xsd:schema xmlns:xsd="http://www.w3.org/2001/XMLSchema" xmlns:xs="http://www.w3.org/2001/XMLSchema" xmlns:p="http://schemas.microsoft.com/office/2006/metadata/properties" xmlns:ns2="74AB046D-40EB-488B-ABA9-937A83031C9B" targetNamespace="http://schemas.microsoft.com/office/2006/metadata/properties" ma:root="true" ma:fieldsID="2fd630261e4128d77de5ca0610f944b8" ns2:_="">
     <xsd:import namespace="74AB046D-40EB-488B-ABA9-937A83031C9B"/>
@@ -11998,15 +12368,6 @@
 </ct:contentTypeSchema>
 </file>
 
-<file path=customXml/item3.xml><?xml version="1.0" encoding="utf-8"?>
-<?mso-contentType ?>
-<FormTemplates xmlns="http://schemas.microsoft.com/sharepoint/v3/contenttype/forms">
-  <Display>DocumentLibraryForm</Display>
-  <Edit>DocumentLibraryForm</Edit>
-  <New>DocumentLibraryForm</New>
-</FormTemplates>
-</file>
-
 <file path=customXml/itemProps1.xml><?xml version="1.0" encoding="utf-8"?>
 <ds:datastoreItem xmlns:ds="http://schemas.openxmlformats.org/officeDocument/2006/customXml" ds:itemID="{4D01FA1F-EB5F-45CF-9276-A2E0FC34F5A3}">
   <ds:schemaRefs>
@@ -12018,6 +12379,14 @@
 </file>
 
 <file path=customXml/itemProps2.xml><?xml version="1.0" encoding="utf-8"?>
+<ds:datastoreItem xmlns:ds="http://schemas.openxmlformats.org/officeDocument/2006/customXml" ds:itemID="{683A9330-F5A2-4815-B76B-50CD0A9C21FE}">
+  <ds:schemaRefs>
+    <ds:schemaRef ds:uri="http://schemas.microsoft.com/sharepoint/v3/contenttype/forms"/>
+  </ds:schemaRefs>
+</ds:datastoreItem>
+</file>
+
+<file path=customXml/itemProps3.xml><?xml version="1.0" encoding="utf-8"?>
 <ds:datastoreItem xmlns:ds="http://schemas.openxmlformats.org/officeDocument/2006/customXml" ds:itemID="{F6A58999-A8DA-42EB-B319-FAECE6F9EF8C}">
   <ds:schemaRefs>
     <ds:schemaRef ds:uri="http://schemas.microsoft.com/office/2006/metadata/contentType"/>
@@ -12033,12 +12402,4 @@
     <ds:schemaRef ds:uri="http://schemas.microsoft.com/internal/obd"/>
   </ds:schemaRefs>
 </ds:datastoreItem>
-</file>
-
-<file path=customXml/itemProps3.xml><?xml version="1.0" encoding="utf-8"?>
-<ds:datastoreItem xmlns:ds="http://schemas.openxmlformats.org/officeDocument/2006/customXml" ds:itemID="{683A9330-F5A2-4815-B76B-50CD0A9C21FE}">
-  <ds:schemaRefs>
-    <ds:schemaRef ds:uri="http://schemas.microsoft.com/sharepoint/v3/contenttype/forms"/>
-  </ds:schemaRefs>
-</ds:datastoreItem>
 </file>
</xml_diff>